<commit_message>
#13 CORS Issue handling from back end.
</commit_message>
<xml_diff>
--- a/Docs/Reaprich Progress Review.pptx
+++ b/Docs/Reaprich Progress Review.pptx
@@ -3005,7 +3005,7 @@
           <a:p>
             <a:fld id="{60084818-D356-4B6D-AC9B-F239C57D06FF}" type="datetimeFigureOut">
               <a:rPr lang="en-IN" smtClean="0"/>
-              <a:t>16-09-2023</a:t>
+              <a:t>19-09-2023</a:t>
             </a:fld>
             <a:endParaRPr lang="en-IN"/>
           </a:p>
@@ -3205,7 +3205,7 @@
           <a:p>
             <a:fld id="{60084818-D356-4B6D-AC9B-F239C57D06FF}" type="datetimeFigureOut">
               <a:rPr lang="en-IN" smtClean="0"/>
-              <a:t>16-09-2023</a:t>
+              <a:t>19-09-2023</a:t>
             </a:fld>
             <a:endParaRPr lang="en-IN"/>
           </a:p>
@@ -3415,7 +3415,7 @@
           <a:p>
             <a:fld id="{60084818-D356-4B6D-AC9B-F239C57D06FF}" type="datetimeFigureOut">
               <a:rPr lang="en-IN" smtClean="0"/>
-              <a:t>16-09-2023</a:t>
+              <a:t>19-09-2023</a:t>
             </a:fld>
             <a:endParaRPr lang="en-IN"/>
           </a:p>
@@ -3615,7 +3615,7 @@
           <a:p>
             <a:fld id="{60084818-D356-4B6D-AC9B-F239C57D06FF}" type="datetimeFigureOut">
               <a:rPr lang="en-IN" smtClean="0"/>
-              <a:t>16-09-2023</a:t>
+              <a:t>19-09-2023</a:t>
             </a:fld>
             <a:endParaRPr lang="en-IN"/>
           </a:p>
@@ -3891,7 +3891,7 @@
           <a:p>
             <a:fld id="{60084818-D356-4B6D-AC9B-F239C57D06FF}" type="datetimeFigureOut">
               <a:rPr lang="en-IN" smtClean="0"/>
-              <a:t>16-09-2023</a:t>
+              <a:t>19-09-2023</a:t>
             </a:fld>
             <a:endParaRPr lang="en-IN"/>
           </a:p>
@@ -4159,7 +4159,7 @@
           <a:p>
             <a:fld id="{60084818-D356-4B6D-AC9B-F239C57D06FF}" type="datetimeFigureOut">
               <a:rPr lang="en-IN" smtClean="0"/>
-              <a:t>16-09-2023</a:t>
+              <a:t>19-09-2023</a:t>
             </a:fld>
             <a:endParaRPr lang="en-IN"/>
           </a:p>
@@ -4574,7 +4574,7 @@
           <a:p>
             <a:fld id="{60084818-D356-4B6D-AC9B-F239C57D06FF}" type="datetimeFigureOut">
               <a:rPr lang="en-IN" smtClean="0"/>
-              <a:t>16-09-2023</a:t>
+              <a:t>19-09-2023</a:t>
             </a:fld>
             <a:endParaRPr lang="en-IN"/>
           </a:p>
@@ -4716,7 +4716,7 @@
           <a:p>
             <a:fld id="{60084818-D356-4B6D-AC9B-F239C57D06FF}" type="datetimeFigureOut">
               <a:rPr lang="en-IN" smtClean="0"/>
-              <a:t>16-09-2023</a:t>
+              <a:t>19-09-2023</a:t>
             </a:fld>
             <a:endParaRPr lang="en-IN"/>
           </a:p>
@@ -4829,7 +4829,7 @@
           <a:p>
             <a:fld id="{60084818-D356-4B6D-AC9B-F239C57D06FF}" type="datetimeFigureOut">
               <a:rPr lang="en-IN" smtClean="0"/>
-              <a:t>16-09-2023</a:t>
+              <a:t>19-09-2023</a:t>
             </a:fld>
             <a:endParaRPr lang="en-IN"/>
           </a:p>
@@ -5142,7 +5142,7 @@
           <a:p>
             <a:fld id="{60084818-D356-4B6D-AC9B-F239C57D06FF}" type="datetimeFigureOut">
               <a:rPr lang="en-IN" smtClean="0"/>
-              <a:t>16-09-2023</a:t>
+              <a:t>19-09-2023</a:t>
             </a:fld>
             <a:endParaRPr lang="en-IN"/>
           </a:p>
@@ -5431,7 +5431,7 @@
           <a:p>
             <a:fld id="{60084818-D356-4B6D-AC9B-F239C57D06FF}" type="datetimeFigureOut">
               <a:rPr lang="en-IN" smtClean="0"/>
-              <a:t>16-09-2023</a:t>
+              <a:t>19-09-2023</a:t>
             </a:fld>
             <a:endParaRPr lang="en-IN"/>
           </a:p>
@@ -5674,7 +5674,7 @@
           <a:p>
             <a:fld id="{60084818-D356-4B6D-AC9B-F239C57D06FF}" type="datetimeFigureOut">
               <a:rPr lang="en-IN" smtClean="0"/>
-              <a:t>16-09-2023</a:t>
+              <a:t>19-09-2023</a:t>
             </a:fld>
             <a:endParaRPr lang="en-IN"/>
           </a:p>
@@ -8918,21 +8918,28 @@
           <a:p>
             <a:r>
               <a:rPr lang="en-US" dirty="0"/>
-              <a:t>New Feature for </a:t>
+              <a:t>Outlet and TD registration and management will be done by Admin only. – There is no self registration.</a:t>
+            </a:r>
+          </a:p>
+          <a:p>
+            <a:r>
+              <a:rPr lang="en-US" dirty="0"/>
+              <a:t>The current understanding and development of back-end is correct and agreed by client.</a:t>
+            </a:r>
+          </a:p>
+          <a:p>
+            <a:r>
+              <a:rPr lang="en-US" dirty="0"/>
+              <a:t>New Feature requested for 2</a:t>
             </a:r>
             <a:r>
-              <a:rPr lang="en-US"/>
-              <a:t>2</a:t>
-            </a:r>
-            <a:r>
-              <a:rPr lang="en-US" baseline="30000"/>
+              <a:rPr lang="en-US" baseline="30000" dirty="0"/>
               <a:t>nd</a:t>
             </a:r>
             <a:r>
-              <a:rPr lang="en-US"/>
+              <a:rPr lang="en-US" dirty="0"/>
               <a:t> Phase</a:t>
             </a:r>
-            <a:endParaRPr lang="en-US" dirty="0"/>
           </a:p>
           <a:p>
             <a:pPr lvl="1"/>
@@ -9447,19 +9454,7 @@
             <a:pPr marL="0" indent="0" algn="r">
               <a:buNone/>
             </a:pPr>
-            <a:r>
-              <a:rPr lang="en-IN" sz="1400" dirty="0"/>
-              <a:t>Sanjay Padhiyar</a:t>
-            </a:r>
-          </a:p>
-          <a:p>
-            <a:pPr marL="0" indent="0" algn="r">
-              <a:buNone/>
-            </a:pPr>
-            <a:r>
-              <a:rPr lang="en-IN" sz="1400" dirty="0"/>
-              <a:t>Amit Maheshwari</a:t>
-            </a:r>
+            <a:endParaRPr lang="en-IN" sz="1400" dirty="0"/>
           </a:p>
         </p:txBody>
       </p:sp>

</xml_diff>